<commit_message>
Update PowerPoint modèle (à copier_coller).pptx
</commit_message>
<xml_diff>
--- a/Nathan/PowerPoint modèle (à copier_coller).pptx
+++ b/Nathan/PowerPoint modèle (à copier_coller).pptx
@@ -8,6 +8,8 @@
     <p:sldId id="256" r:id="rId2"/>
     <p:sldId id="257" r:id="rId3"/>
     <p:sldId id="258" r:id="rId4"/>
+    <p:sldId id="259" r:id="rId5"/>
+    <p:sldId id="260" r:id="rId6"/>
   </p:sldIdLst>
   <p:sldSz cx="12192000" cy="6858000"/>
   <p:notesSz cx="6858000" cy="9144000"/>
@@ -106,6 +108,11 @@
       </a:defRPr>
     </a:lvl9pPr>
   </p:defaultTextStyle>
+  <p:extLst>
+    <p:ext uri="{EFAFB233-063F-42B5-8137-9DF3F51BA10A}">
+      <p15:sldGuideLst xmlns:p15="http://schemas.microsoft.com/office/powerpoint/2012/main"/>
+    </p:ext>
+  </p:extLst>
 </p:presentation>
 </file>
 
@@ -832,7 +839,7 @@
             <a:fld id="{B61BEF0D-F0BB-DE4B-95CE-6DB70DBA9567}" type="datetimeFigureOut">
               <a:rPr lang="en-US" dirty="0"/>
               <a:pPr/>
-              <a:t>1/17/2020</a:t>
+              <a:t>1/22/2020</a:t>
             </a:fld>
             <a:endParaRPr lang="en-US" dirty="0"/>
           </a:p>
@@ -1080,7 +1087,7 @@
             <a:fld id="{B61BEF0D-F0BB-DE4B-95CE-6DB70DBA9567}" type="datetimeFigureOut">
               <a:rPr lang="en-US" dirty="0"/>
               <a:pPr/>
-              <a:t>1/17/2020</a:t>
+              <a:t>1/22/2020</a:t>
             </a:fld>
             <a:endParaRPr lang="en-US" dirty="0"/>
           </a:p>
@@ -1391,7 +1398,7 @@
             <a:fld id="{B61BEF0D-F0BB-DE4B-95CE-6DB70DBA9567}" type="datetimeFigureOut">
               <a:rPr lang="en-US" dirty="0"/>
               <a:pPr/>
-              <a:t>1/17/2020</a:t>
+              <a:t>1/22/2020</a:t>
             </a:fld>
             <a:endParaRPr lang="en-US" dirty="0"/>
           </a:p>
@@ -1729,7 +1736,7 @@
             <a:fld id="{B61BEF0D-F0BB-DE4B-95CE-6DB70DBA9567}" type="datetimeFigureOut">
               <a:rPr lang="en-US" dirty="0"/>
               <a:pPr/>
-              <a:t>1/17/2020</a:t>
+              <a:t>1/22/2020</a:t>
             </a:fld>
             <a:endParaRPr lang="en-US" dirty="0"/>
           </a:p>
@@ -2040,7 +2047,7 @@
             <a:fld id="{B61BEF0D-F0BB-DE4B-95CE-6DB70DBA9567}" type="datetimeFigureOut">
               <a:rPr lang="en-US" dirty="0"/>
               <a:pPr/>
-              <a:t>1/17/2020</a:t>
+              <a:t>1/22/2020</a:t>
             </a:fld>
             <a:endParaRPr lang="en-US" dirty="0"/>
           </a:p>
@@ -2430,7 +2437,7 @@
             <a:fld id="{B61BEF0D-F0BB-DE4B-95CE-6DB70DBA9567}" type="datetimeFigureOut">
               <a:rPr lang="en-US" dirty="0"/>
               <a:pPr/>
-              <a:t>1/17/2020</a:t>
+              <a:t>1/22/2020</a:t>
             </a:fld>
             <a:endParaRPr lang="en-US" dirty="0"/>
           </a:p>
@@ -2596,7 +2603,7 @@
           <a:p>
             <a:fld id="{55C6B4A9-1611-4792-9094-5F34BCA07E0B}" type="datetimeFigureOut">
               <a:rPr lang="en-US" dirty="0"/>
-              <a:t>1/17/2020</a:t>
+              <a:t>1/22/2020</a:t>
             </a:fld>
             <a:endParaRPr lang="en-US" dirty="0"/>
           </a:p>
@@ -2772,7 +2779,7 @@
             <a:fld id="{B61BEF0D-F0BB-DE4B-95CE-6DB70DBA9567}" type="datetimeFigureOut">
               <a:rPr lang="en-US" dirty="0"/>
               <a:pPr/>
-              <a:t>1/17/2020</a:t>
+              <a:t>1/22/2020</a:t>
             </a:fld>
             <a:endParaRPr lang="en-US" dirty="0"/>
           </a:p>
@@ -2945,7 +2952,7 @@
             <a:fld id="{B61BEF0D-F0BB-DE4B-95CE-6DB70DBA9567}" type="datetimeFigureOut">
               <a:rPr lang="en-US" dirty="0"/>
               <a:pPr/>
-              <a:t>1/17/2020</a:t>
+              <a:t>1/22/2020</a:t>
             </a:fld>
             <a:endParaRPr lang="en-US" dirty="0"/>
           </a:p>
@@ -3189,7 +3196,7 @@
             <a:fld id="{B61BEF0D-F0BB-DE4B-95CE-6DB70DBA9567}" type="datetimeFigureOut">
               <a:rPr lang="en-US" dirty="0"/>
               <a:pPr/>
-              <a:t>1/17/2020</a:t>
+              <a:t>1/22/2020</a:t>
             </a:fld>
             <a:endParaRPr lang="en-US" dirty="0"/>
           </a:p>
@@ -3417,7 +3424,7 @@
           <a:p>
             <a:fld id="{EB712588-04B1-427B-82EE-E8DB90309F08}" type="datetimeFigureOut">
               <a:rPr lang="en-US" dirty="0"/>
-              <a:t>1/17/2020</a:t>
+              <a:t>1/22/2020</a:t>
             </a:fld>
             <a:endParaRPr lang="en-US" dirty="0"/>
           </a:p>
@@ -3787,7 +3794,7 @@
             <a:fld id="{B61BEF0D-F0BB-DE4B-95CE-6DB70DBA9567}" type="datetimeFigureOut">
               <a:rPr lang="en-US" dirty="0"/>
               <a:pPr/>
-              <a:t>1/17/2020</a:t>
+              <a:t>1/22/2020</a:t>
             </a:fld>
             <a:endParaRPr lang="en-US" dirty="0"/>
           </a:p>
@@ -3907,7 +3914,7 @@
             <a:fld id="{B61BEF0D-F0BB-DE4B-95CE-6DB70DBA9567}" type="datetimeFigureOut">
               <a:rPr lang="en-US" dirty="0"/>
               <a:pPr/>
-              <a:t>1/17/2020</a:t>
+              <a:t>1/22/2020</a:t>
             </a:fld>
             <a:endParaRPr lang="en-US" dirty="0"/>
           </a:p>
@@ -3999,7 +4006,7 @@
             <a:fld id="{B61BEF0D-F0BB-DE4B-95CE-6DB70DBA9567}" type="datetimeFigureOut">
               <a:rPr lang="en-US" dirty="0"/>
               <a:pPr/>
-              <a:t>1/17/2020</a:t>
+              <a:t>1/22/2020</a:t>
             </a:fld>
             <a:endParaRPr lang="en-US" dirty="0"/>
           </a:p>
@@ -4250,7 +4257,7 @@
           <a:p>
             <a:fld id="{42A54C80-263E-416B-A8E0-580EDEADCBDC}" type="datetimeFigureOut">
               <a:rPr lang="en-US" dirty="0"/>
-              <a:t>1/17/2020</a:t>
+              <a:t>1/22/2020</a:t>
             </a:fld>
             <a:endParaRPr lang="en-US" dirty="0"/>
           </a:p>
@@ -4509,7 +4516,7 @@
             <a:fld id="{B61BEF0D-F0BB-DE4B-95CE-6DB70DBA9567}" type="datetimeFigureOut">
               <a:rPr lang="en-US" dirty="0"/>
               <a:pPr/>
-              <a:t>1/17/2020</a:t>
+              <a:t>1/22/2020</a:t>
             </a:fld>
             <a:endParaRPr lang="en-US" dirty="0"/>
           </a:p>
@@ -5249,7 +5256,7 @@
             <a:fld id="{B61BEF0D-F0BB-DE4B-95CE-6DB70DBA9567}" type="datetimeFigureOut">
               <a:rPr lang="en-US" dirty="0"/>
               <a:pPr/>
-              <a:t>1/17/2020</a:t>
+              <a:t>1/22/2020</a:t>
             </a:fld>
             <a:endParaRPr lang="en-US" dirty="0"/>
           </a:p>
@@ -6860,13 +6867,13 @@
   <p:clrMapOvr>
     <a:masterClrMapping/>
   </p:clrMapOvr>
-  <mc:AlternateContent xmlns:mc="http://schemas.openxmlformats.org/markup-compatibility/2006">
-    <mc:Choice xmlns:p14="http://schemas.microsoft.com/office/powerpoint/2010/main" Requires="p14">
+  <mc:AlternateContent xmlns:mc="http://schemas.openxmlformats.org/markup-compatibility/2006" xmlns:p14="http://schemas.microsoft.com/office/powerpoint/2010/main">
+    <mc:Choice Requires="p14">
       <p:transition spd="slow" p14:dur="1600">
         <p:blinds dir="vert"/>
       </p:transition>
     </mc:Choice>
-    <mc:Fallback>
+    <mc:Fallback xmlns="">
       <p:transition spd="slow">
         <p:blinds dir="vert"/>
       </p:transition>
@@ -6937,161 +6944,6 @@
           </a:extLst>
         </p:spPr>
       </p:pic>
-      <p:sp>
-        <p:nvSpPr>
-          <p:cNvPr id="8" name="ZoneTexte 7">
-            <a:extLst>
-              <a:ext uri="{FF2B5EF4-FFF2-40B4-BE49-F238E27FC236}">
-                <a16:creationId xmlns:a16="http://schemas.microsoft.com/office/drawing/2014/main" id="{FFE0343E-2810-49E5-8238-0B973219F3E5}"/>
-              </a:ext>
-            </a:extLst>
-          </p:cNvPr>
-          <p:cNvSpPr txBox="1"/>
-          <p:nvPr/>
-        </p:nvSpPr>
-        <p:spPr>
-          <a:xfrm>
-            <a:off x="265853" y="2261945"/>
-            <a:ext cx="9151535" cy="4187237"/>
-          </a:xfrm>
-          <a:prstGeom prst="rect">
-            <a:avLst/>
-          </a:prstGeom>
-          <a:noFill/>
-          <a:ln>
-            <a:noFill/>
-          </a:ln>
-          <a:effectLst>
-            <a:glow rad="63500">
-              <a:schemeClr val="accent4">
-                <a:satMod val="175000"/>
-                <a:alpha val="40000"/>
-              </a:schemeClr>
-            </a:glow>
-            <a:outerShdw blurRad="50800" dist="38100" dir="5400000" algn="t" rotWithShape="0">
-              <a:prstClr val="black">
-                <a:alpha val="40000"/>
-              </a:prstClr>
-            </a:outerShdw>
-          </a:effectLst>
-        </p:spPr>
-        <p:txBody>
-          <a:bodyPr wrap="square" rtlCol="0">
-            <a:spAutoFit/>
-          </a:bodyPr>
-          <a:lstStyle/>
-          <a:p>
-            <a:pPr algn="ctr">
-              <a:lnSpc>
-                <a:spcPct val="150000"/>
-              </a:lnSpc>
-            </a:pPr>
-            <a:r>
-              <a:rPr lang="fr-FR" sz="3600" b="1" u="sng" dirty="0">
-                <a:solidFill>
-                  <a:srgbClr val="A41258"/>
-                </a:solidFill>
-                <a:latin typeface="Eras Medium ITC" panose="020B0602030504020804" pitchFamily="34" charset="0"/>
-              </a:rPr>
-              <a:t>ATTENTION !</a:t>
-            </a:r>
-          </a:p>
-          <a:p>
-            <a:pPr algn="ctr">
-              <a:lnSpc>
-                <a:spcPct val="150000"/>
-              </a:lnSpc>
-            </a:pPr>
-            <a:endParaRPr lang="fr-FR" sz="2400" dirty="0">
-              <a:solidFill>
-                <a:srgbClr val="A41258"/>
-              </a:solidFill>
-              <a:latin typeface="Eras Medium ITC" panose="020B0602030504020804" pitchFamily="34" charset="0"/>
-            </a:endParaRPr>
-          </a:p>
-          <a:p>
-            <a:pPr algn="ctr">
-              <a:lnSpc>
-                <a:spcPct val="150000"/>
-              </a:lnSpc>
-            </a:pPr>
-            <a:r>
-              <a:rPr lang="fr-FR" sz="2400" dirty="0">
-                <a:latin typeface="Eras Medium ITC" panose="020B0602030504020804" pitchFamily="34" charset="0"/>
-              </a:rPr>
-              <a:t>Trois couleurs primaires à utilisées : Le NOIR (texte), Le </a:t>
-            </a:r>
-            <a:r>
-              <a:rPr lang="fr-FR" sz="2400" dirty="0">
-                <a:solidFill>
-                  <a:srgbClr val="A41258"/>
-                </a:solidFill>
-                <a:latin typeface="Eras Medium ITC" panose="020B0602030504020804" pitchFamily="34" charset="0"/>
-              </a:rPr>
-              <a:t>violet (Texte à ressortir)</a:t>
-            </a:r>
-            <a:r>
-              <a:rPr lang="fr-FR" sz="2400" dirty="0">
-                <a:latin typeface="Eras Medium ITC" panose="020B0602030504020804" pitchFamily="34" charset="0"/>
-              </a:rPr>
-              <a:t>, le </a:t>
-            </a:r>
-            <a:r>
-              <a:rPr lang="fr-FR" sz="2400" dirty="0">
-                <a:solidFill>
-                  <a:srgbClr val="FF9900"/>
-                </a:solidFill>
-                <a:latin typeface="Eras Medium ITC" panose="020B0602030504020804" pitchFamily="34" charset="0"/>
-              </a:rPr>
-              <a:t>Orange clair(…)</a:t>
-            </a:r>
-          </a:p>
-          <a:p>
-            <a:pPr algn="ctr">
-              <a:lnSpc>
-                <a:spcPct val="150000"/>
-              </a:lnSpc>
-            </a:pPr>
-            <a:endParaRPr lang="fr-FR" sz="2400" dirty="0">
-              <a:solidFill>
-                <a:srgbClr val="FF9900"/>
-              </a:solidFill>
-              <a:latin typeface="Eras Medium ITC" panose="020B0602030504020804" pitchFamily="34" charset="0"/>
-            </a:endParaRPr>
-          </a:p>
-          <a:p>
-            <a:pPr algn="ctr">
-              <a:lnSpc>
-                <a:spcPct val="150000"/>
-              </a:lnSpc>
-            </a:pPr>
-            <a:r>
-              <a:rPr lang="fr-FR" sz="2400" dirty="0">
-                <a:latin typeface="Eras Medium ITC" panose="020B0602030504020804" pitchFamily="34" charset="0"/>
-              </a:rPr>
-              <a:t>Police d’écriture principale : </a:t>
-            </a:r>
-            <a:r>
-              <a:rPr lang="fr-FR" sz="2400" dirty="0">
-                <a:solidFill>
-                  <a:srgbClr val="A41258"/>
-                </a:solidFill>
-                <a:latin typeface="Eras Medium ITC" panose="020B0602030504020804" pitchFamily="34" charset="0"/>
-              </a:rPr>
-              <a:t>ERAS MEDIUM ITC</a:t>
-            </a:r>
-            <a:r>
-              <a:rPr lang="fr-FR" sz="2400" dirty="0">
-                <a:latin typeface="Eras Medium ITC" panose="020B0602030504020804" pitchFamily="34" charset="0"/>
-              </a:rPr>
-              <a:t> (éviter d’autres polices trop différentes !)</a:t>
-            </a:r>
-            <a:endParaRPr lang="fr-FR" sz="1600" dirty="0">
-              <a:latin typeface="Eras Medium ITC" panose="020B0602030504020804" pitchFamily="34" charset="0"/>
-            </a:endParaRPr>
-          </a:p>
-        </p:txBody>
-      </p:sp>
     </p:spTree>
     <p:extLst>
       <p:ext uri="{BB962C8B-B14F-4D97-AF65-F5344CB8AC3E}">
@@ -7102,13 +6954,13 @@
   <p:clrMapOvr>
     <a:masterClrMapping/>
   </p:clrMapOvr>
-  <mc:AlternateContent xmlns:mc="http://schemas.openxmlformats.org/markup-compatibility/2006">
-    <mc:Choice xmlns:p14="http://schemas.microsoft.com/office/powerpoint/2010/main" Requires="p14">
+  <mc:AlternateContent xmlns:mc="http://schemas.openxmlformats.org/markup-compatibility/2006" xmlns:p14="http://schemas.microsoft.com/office/powerpoint/2010/main">
+    <mc:Choice Requires="p14">
       <p:transition spd="slow" p14:dur="3400">
         <p14:reveal/>
       </p:transition>
     </mc:Choice>
-    <mc:Fallback>
+    <mc:Fallback xmlns="">
       <p:transition spd="slow">
         <p:fade/>
       </p:transition>
@@ -7189,13 +7041,187 @@
   <p:clrMapOvr>
     <a:masterClrMapping/>
   </p:clrMapOvr>
-  <mc:AlternateContent xmlns:mc="http://schemas.openxmlformats.org/markup-compatibility/2006">
-    <mc:Choice xmlns:p159="http://schemas.microsoft.com/office/powerpoint/2015/09/main" Requires="p159">
+  <mc:AlternateContent xmlns:mc="http://schemas.openxmlformats.org/markup-compatibility/2006" xmlns:p159="http://schemas.microsoft.com/office/powerpoint/2015/09/main">
+    <mc:Choice Requires="p159">
       <p:transition xmlns:p14="http://schemas.microsoft.com/office/powerpoint/2010/main" spd="slow" p14:dur="2000">
         <p159:morph option="byObject"/>
       </p:transition>
     </mc:Choice>
-    <mc:Fallback>
+    <mc:Fallback xmlns="">
+      <p:transition spd="slow">
+        <p:fade/>
+      </p:transition>
+    </mc:Fallback>
+  </mc:AlternateContent>
+</p:sld>
+</file>
+
+<file path=ppt/slides/slide4.xml><?xml version="1.0" encoding="utf-8"?>
+<p:sld xmlns:a="http://schemas.openxmlformats.org/drawingml/2006/main" xmlns:r="http://schemas.openxmlformats.org/officeDocument/2006/relationships" xmlns:p="http://schemas.openxmlformats.org/presentationml/2006/main">
+  <p:cSld>
+    <p:spTree>
+      <p:nvGrpSpPr>
+        <p:cNvPr id="1" name=""/>
+        <p:cNvGrpSpPr/>
+        <p:nvPr/>
+      </p:nvGrpSpPr>
+      <p:grpSpPr>
+        <a:xfrm>
+          <a:off x="0" y="0"/>
+          <a:ext cx="0" cy="0"/>
+          <a:chOff x="0" y="0"/>
+          <a:chExt cx="0" cy="0"/>
+        </a:xfrm>
+      </p:grpSpPr>
+      <p:pic>
+        <p:nvPicPr>
+          <p:cNvPr id="1026" name="Picture 2" descr="Image associée">
+            <a:extLst>
+              <a:ext uri="{FF2B5EF4-FFF2-40B4-BE49-F238E27FC236}">
+                <a16:creationId xmlns:a16="http://schemas.microsoft.com/office/drawing/2014/main" id="{C816F3D8-CC4C-46B3-A21E-58AE9AD30454}"/>
+              </a:ext>
+            </a:extLst>
+          </p:cNvPr>
+          <p:cNvPicPr>
+            <a:picLocks noChangeAspect="1" noChangeArrowheads="1"/>
+          </p:cNvPicPr>
+          <p:nvPr/>
+        </p:nvPicPr>
+        <p:blipFill rotWithShape="1">
+          <a:blip r:embed="rId2">
+            <a:extLst>
+              <a:ext uri="{28A0092B-C50C-407E-A947-70E740481C1C}">
+                <a14:useLocalDpi xmlns:a14="http://schemas.microsoft.com/office/drawing/2010/main" val="0"/>
+              </a:ext>
+            </a:extLst>
+          </a:blip>
+          <a:srcRect l="18677" r="15441"/>
+          <a:stretch/>
+        </p:blipFill>
+        <p:spPr bwMode="auto">
+          <a:xfrm>
+            <a:off x="143436" y="143435"/>
+            <a:ext cx="2269635" cy="609600"/>
+          </a:xfrm>
+          <a:prstGeom prst="rect">
+            <a:avLst/>
+          </a:prstGeom>
+          <a:noFill/>
+          <a:extLst>
+            <a:ext uri="{909E8E84-426E-40DD-AFC4-6F175D3DCCD1}">
+              <a14:hiddenFill xmlns:a14="http://schemas.microsoft.com/office/drawing/2010/main">
+                <a:solidFill>
+                  <a:srgbClr val="FFFFFF"/>
+                </a:solidFill>
+              </a14:hiddenFill>
+            </a:ext>
+          </a:extLst>
+        </p:spPr>
+      </p:pic>
+    </p:spTree>
+    <p:extLst>
+      <p:ext uri="{BB962C8B-B14F-4D97-AF65-F5344CB8AC3E}">
+        <p14:creationId xmlns:p14="http://schemas.microsoft.com/office/powerpoint/2010/main" val="3529468727"/>
+      </p:ext>
+    </p:extLst>
+  </p:cSld>
+  <p:clrMapOvr>
+    <a:masterClrMapping/>
+  </p:clrMapOvr>
+  <mc:AlternateContent xmlns:mc="http://schemas.openxmlformats.org/markup-compatibility/2006" xmlns:p159="http://schemas.microsoft.com/office/powerpoint/2015/09/main">
+    <mc:Choice Requires="p159">
+      <p:transition xmlns:p14="http://schemas.microsoft.com/office/powerpoint/2010/main" spd="slow" p14:dur="2000">
+        <p159:morph option="byObject"/>
+      </p:transition>
+    </mc:Choice>
+    <mc:Fallback xmlns="">
+      <p:transition spd="slow">
+        <p:fade/>
+      </p:transition>
+    </mc:Fallback>
+  </mc:AlternateContent>
+</p:sld>
+</file>
+
+<file path=ppt/slides/slide5.xml><?xml version="1.0" encoding="utf-8"?>
+<p:sld xmlns:a="http://schemas.openxmlformats.org/drawingml/2006/main" xmlns:r="http://schemas.openxmlformats.org/officeDocument/2006/relationships" xmlns:p="http://schemas.openxmlformats.org/presentationml/2006/main">
+  <p:cSld>
+    <p:spTree>
+      <p:nvGrpSpPr>
+        <p:cNvPr id="1" name=""/>
+        <p:cNvGrpSpPr/>
+        <p:nvPr/>
+      </p:nvGrpSpPr>
+      <p:grpSpPr>
+        <a:xfrm>
+          <a:off x="0" y="0"/>
+          <a:ext cx="0" cy="0"/>
+          <a:chOff x="0" y="0"/>
+          <a:chExt cx="0" cy="0"/>
+        </a:xfrm>
+      </p:grpSpPr>
+      <p:pic>
+        <p:nvPicPr>
+          <p:cNvPr id="1026" name="Picture 2" descr="Image associée">
+            <a:extLst>
+              <a:ext uri="{FF2B5EF4-FFF2-40B4-BE49-F238E27FC236}">
+                <a16:creationId xmlns:a16="http://schemas.microsoft.com/office/drawing/2014/main" id="{C816F3D8-CC4C-46B3-A21E-58AE9AD30454}"/>
+              </a:ext>
+            </a:extLst>
+          </p:cNvPr>
+          <p:cNvPicPr>
+            <a:picLocks noChangeAspect="1" noChangeArrowheads="1"/>
+          </p:cNvPicPr>
+          <p:nvPr/>
+        </p:nvPicPr>
+        <p:blipFill rotWithShape="1">
+          <a:blip r:embed="rId2">
+            <a:extLst>
+              <a:ext uri="{28A0092B-C50C-407E-A947-70E740481C1C}">
+                <a14:useLocalDpi xmlns:a14="http://schemas.microsoft.com/office/drawing/2010/main" val="0"/>
+              </a:ext>
+            </a:extLst>
+          </a:blip>
+          <a:srcRect l="18677" r="15441"/>
+          <a:stretch/>
+        </p:blipFill>
+        <p:spPr bwMode="auto">
+          <a:xfrm>
+            <a:off x="143436" y="143435"/>
+            <a:ext cx="2269635" cy="609600"/>
+          </a:xfrm>
+          <a:prstGeom prst="rect">
+            <a:avLst/>
+          </a:prstGeom>
+          <a:noFill/>
+          <a:extLst>
+            <a:ext uri="{909E8E84-426E-40DD-AFC4-6F175D3DCCD1}">
+              <a14:hiddenFill xmlns:a14="http://schemas.microsoft.com/office/drawing/2010/main">
+                <a:solidFill>
+                  <a:srgbClr val="FFFFFF"/>
+                </a:solidFill>
+              </a14:hiddenFill>
+            </a:ext>
+          </a:extLst>
+        </p:spPr>
+      </p:pic>
+    </p:spTree>
+    <p:extLst>
+      <p:ext uri="{BB962C8B-B14F-4D97-AF65-F5344CB8AC3E}">
+        <p14:creationId xmlns:p14="http://schemas.microsoft.com/office/powerpoint/2010/main" val="3328809043"/>
+      </p:ext>
+    </p:extLst>
+  </p:cSld>
+  <p:clrMapOvr>
+    <a:masterClrMapping/>
+  </p:clrMapOvr>
+  <mc:AlternateContent xmlns:mc="http://schemas.openxmlformats.org/markup-compatibility/2006" xmlns:p159="http://schemas.microsoft.com/office/powerpoint/2015/09/main">
+    <mc:Choice Requires="p159">
+      <p:transition xmlns:p14="http://schemas.microsoft.com/office/powerpoint/2010/main" spd="slow" p14:dur="2000">
+        <p159:morph option="byObject"/>
+      </p:transition>
+    </mc:Choice>
+    <mc:Fallback xmlns="">
       <p:transition spd="slow">
         <p:fade/>
       </p:transition>

</xml_diff>

<commit_message>
Modification diagramme de séquence, Modification du diaporama...
</commit_message>
<xml_diff>
--- a/Nathan/PowerPoint modèle (à copier_coller).pptx
+++ b/Nathan/PowerPoint modèle (à copier_coller).pptx
@@ -10,6 +10,12 @@
     <p:sldId id="258" r:id="rId4"/>
     <p:sldId id="259" r:id="rId5"/>
     <p:sldId id="260" r:id="rId6"/>
+    <p:sldId id="266" r:id="rId7"/>
+    <p:sldId id="261" r:id="rId8"/>
+    <p:sldId id="264" r:id="rId9"/>
+    <p:sldId id="265" r:id="rId10"/>
+    <p:sldId id="262" r:id="rId11"/>
+    <p:sldId id="263" r:id="rId12"/>
   </p:sldIdLst>
   <p:sldSz cx="12192000" cy="6858000"/>
   <p:notesSz cx="6858000" cy="9144000"/>
@@ -6882,6 +6888,296 @@
 </p:sld>
 </file>
 
+<file path=ppt/slides/slide10.xml><?xml version="1.0" encoding="utf-8"?>
+<p:sld xmlns:a="http://schemas.openxmlformats.org/drawingml/2006/main" xmlns:r="http://schemas.openxmlformats.org/officeDocument/2006/relationships" xmlns:p="http://schemas.openxmlformats.org/presentationml/2006/main">
+  <p:cSld>
+    <p:spTree>
+      <p:nvGrpSpPr>
+        <p:cNvPr id="1" name=""/>
+        <p:cNvGrpSpPr/>
+        <p:nvPr/>
+      </p:nvGrpSpPr>
+      <p:grpSpPr>
+        <a:xfrm>
+          <a:off x="0" y="0"/>
+          <a:ext cx="0" cy="0"/>
+          <a:chOff x="0" y="0"/>
+          <a:chExt cx="0" cy="0"/>
+        </a:xfrm>
+      </p:grpSpPr>
+      <p:pic>
+        <p:nvPicPr>
+          <p:cNvPr id="1026" name="Picture 2" descr="Image associée">
+            <a:extLst>
+              <a:ext uri="{FF2B5EF4-FFF2-40B4-BE49-F238E27FC236}">
+                <a16:creationId xmlns:a16="http://schemas.microsoft.com/office/drawing/2014/main" id="{C816F3D8-CC4C-46B3-A21E-58AE9AD30454}"/>
+              </a:ext>
+            </a:extLst>
+          </p:cNvPr>
+          <p:cNvPicPr>
+            <a:picLocks noChangeAspect="1" noChangeArrowheads="1"/>
+          </p:cNvPicPr>
+          <p:nvPr/>
+        </p:nvPicPr>
+        <p:blipFill rotWithShape="1">
+          <a:blip r:embed="rId2">
+            <a:extLst>
+              <a:ext uri="{28A0092B-C50C-407E-A947-70E740481C1C}">
+                <a14:useLocalDpi xmlns:a14="http://schemas.microsoft.com/office/drawing/2010/main" val="0"/>
+              </a:ext>
+            </a:extLst>
+          </a:blip>
+          <a:srcRect l="18677" r="15441"/>
+          <a:stretch/>
+        </p:blipFill>
+        <p:spPr bwMode="auto">
+          <a:xfrm>
+            <a:off x="143436" y="143435"/>
+            <a:ext cx="2269635" cy="609600"/>
+          </a:xfrm>
+          <a:prstGeom prst="rect">
+            <a:avLst/>
+          </a:prstGeom>
+          <a:noFill/>
+          <a:extLst>
+            <a:ext uri="{909E8E84-426E-40DD-AFC4-6F175D3DCCD1}">
+              <a14:hiddenFill xmlns:a14="http://schemas.microsoft.com/office/drawing/2010/main">
+                <a:solidFill>
+                  <a:srgbClr val="FFFFFF"/>
+                </a:solidFill>
+              </a14:hiddenFill>
+            </a:ext>
+          </a:extLst>
+        </p:spPr>
+      </p:pic>
+      <p:sp>
+        <p:nvSpPr>
+          <p:cNvPr id="3" name="ZoneTexte 2">
+            <a:extLst>
+              <a:ext uri="{FF2B5EF4-FFF2-40B4-BE49-F238E27FC236}">
+                <a16:creationId xmlns:a16="http://schemas.microsoft.com/office/drawing/2014/main" id="{B5DA24B5-6993-45AE-B83E-5BA1E69FACD0}"/>
+              </a:ext>
+            </a:extLst>
+          </p:cNvPr>
+          <p:cNvSpPr txBox="1"/>
+          <p:nvPr/>
+        </p:nvSpPr>
+        <p:spPr>
+          <a:xfrm>
+            <a:off x="2816352" y="143435"/>
+            <a:ext cx="5342576" cy="646331"/>
+          </a:xfrm>
+          <a:prstGeom prst="rect">
+            <a:avLst/>
+          </a:prstGeom>
+          <a:noFill/>
+          <a:ln>
+            <a:noFill/>
+          </a:ln>
+          <a:effectLst>
+            <a:glow rad="63500">
+              <a:schemeClr val="accent4">
+                <a:satMod val="175000"/>
+                <a:alpha val="40000"/>
+              </a:schemeClr>
+            </a:glow>
+            <a:outerShdw blurRad="50800" dist="38100" dir="5400000" algn="t" rotWithShape="0">
+              <a:prstClr val="black">
+                <a:alpha val="40000"/>
+              </a:prstClr>
+            </a:outerShdw>
+          </a:effectLst>
+          <a:scene3d>
+            <a:camera prst="orthographicFront">
+              <a:rot lat="0" lon="0" rev="0"/>
+            </a:camera>
+            <a:lightRig rig="soft" dir="t">
+              <a:rot lat="0" lon="0" rev="0"/>
+            </a:lightRig>
+          </a:scene3d>
+          <a:sp3d contourW="44450" prstMaterial="matte">
+            <a:bevelT w="63500" h="63500" prst="artDeco"/>
+            <a:contourClr>
+              <a:srgbClr val="FFFFFF"/>
+            </a:contourClr>
+          </a:sp3d>
+        </p:spPr>
+        <p:txBody>
+          <a:bodyPr wrap="square" rtlCol="0">
+            <a:spAutoFit/>
+          </a:bodyPr>
+          <a:lstStyle/>
+          <a:p>
+            <a:pPr algn="ctr"/>
+            <a:r>
+              <a:rPr lang="fr-FR" sz="3600" b="1" dirty="0">
+                <a:latin typeface="Eras Medium ITC" panose="020B0602030504020804" pitchFamily="34" charset="0"/>
+              </a:rPr>
+              <a:t>Schéma du </a:t>
+            </a:r>
+            <a:r>
+              <a:rPr lang="fr-FR" sz="3600" b="1" dirty="0">
+                <a:solidFill>
+                  <a:srgbClr val="A41258"/>
+                </a:solidFill>
+                <a:latin typeface="Eras Medium ITC" panose="020B0602030504020804" pitchFamily="34" charset="0"/>
+              </a:rPr>
+              <a:t>réseau</a:t>
+            </a:r>
+            <a:r>
+              <a:rPr lang="fr-FR" sz="3600" b="1" dirty="0">
+                <a:latin typeface="Eras Medium ITC" panose="020B0602030504020804" pitchFamily="34" charset="0"/>
+              </a:rPr>
+              <a:t> :</a:t>
+            </a:r>
+            <a:endParaRPr lang="fr-FR" sz="3200" b="1" dirty="0">
+              <a:latin typeface="Eras Medium ITC" panose="020B0602030504020804" pitchFamily="34" charset="0"/>
+            </a:endParaRPr>
+          </a:p>
+        </p:txBody>
+      </p:sp>
+      <p:pic>
+        <p:nvPicPr>
+          <p:cNvPr id="2" name="Image 1">
+            <a:extLst>
+              <a:ext uri="{FF2B5EF4-FFF2-40B4-BE49-F238E27FC236}">
+                <a16:creationId xmlns:a16="http://schemas.microsoft.com/office/drawing/2014/main" id="{10D031A8-0679-4012-BA3F-648C05FE51E2}"/>
+              </a:ext>
+            </a:extLst>
+          </p:cNvPr>
+          <p:cNvPicPr>
+            <a:picLocks noChangeAspect="1"/>
+          </p:cNvPicPr>
+          <p:nvPr/>
+        </p:nvPicPr>
+        <p:blipFill>
+          <a:blip r:embed="rId3"/>
+          <a:stretch>
+            <a:fillRect/>
+          </a:stretch>
+        </p:blipFill>
+        <p:spPr>
+          <a:xfrm>
+            <a:off x="439776" y="1285754"/>
+            <a:ext cx="8697087" cy="5105173"/>
+          </a:xfrm>
+          <a:prstGeom prst="rect">
+            <a:avLst/>
+          </a:prstGeom>
+        </p:spPr>
+      </p:pic>
+    </p:spTree>
+    <p:extLst>
+      <p:ext uri="{BB962C8B-B14F-4D97-AF65-F5344CB8AC3E}">
+        <p14:creationId xmlns:p14="http://schemas.microsoft.com/office/powerpoint/2010/main" val="4044395586"/>
+      </p:ext>
+    </p:extLst>
+  </p:cSld>
+  <p:clrMapOvr>
+    <a:masterClrMapping/>
+  </p:clrMapOvr>
+  <mc:AlternateContent xmlns:mc="http://schemas.openxmlformats.org/markup-compatibility/2006" xmlns:p159="http://schemas.microsoft.com/office/powerpoint/2015/09/main">
+    <mc:Choice Requires="p159">
+      <p:transition xmlns:p14="http://schemas.microsoft.com/office/powerpoint/2010/main" spd="slow" p14:dur="2000">
+        <p159:morph option="byObject"/>
+      </p:transition>
+    </mc:Choice>
+    <mc:Fallback xmlns="">
+      <p:transition spd="slow">
+        <p:fade/>
+      </p:transition>
+    </mc:Fallback>
+  </mc:AlternateContent>
+</p:sld>
+</file>
+
+<file path=ppt/slides/slide11.xml><?xml version="1.0" encoding="utf-8"?>
+<p:sld xmlns:a="http://schemas.openxmlformats.org/drawingml/2006/main" xmlns:r="http://schemas.openxmlformats.org/officeDocument/2006/relationships" xmlns:p="http://schemas.openxmlformats.org/presentationml/2006/main">
+  <p:cSld>
+    <p:spTree>
+      <p:nvGrpSpPr>
+        <p:cNvPr id="1" name=""/>
+        <p:cNvGrpSpPr/>
+        <p:nvPr/>
+      </p:nvGrpSpPr>
+      <p:grpSpPr>
+        <a:xfrm>
+          <a:off x="0" y="0"/>
+          <a:ext cx="0" cy="0"/>
+          <a:chOff x="0" y="0"/>
+          <a:chExt cx="0" cy="0"/>
+        </a:xfrm>
+      </p:grpSpPr>
+      <p:pic>
+        <p:nvPicPr>
+          <p:cNvPr id="1026" name="Picture 2" descr="Image associée">
+            <a:extLst>
+              <a:ext uri="{FF2B5EF4-FFF2-40B4-BE49-F238E27FC236}">
+                <a16:creationId xmlns:a16="http://schemas.microsoft.com/office/drawing/2014/main" id="{C816F3D8-CC4C-46B3-A21E-58AE9AD30454}"/>
+              </a:ext>
+            </a:extLst>
+          </p:cNvPr>
+          <p:cNvPicPr>
+            <a:picLocks noChangeAspect="1" noChangeArrowheads="1"/>
+          </p:cNvPicPr>
+          <p:nvPr/>
+        </p:nvPicPr>
+        <p:blipFill rotWithShape="1">
+          <a:blip r:embed="rId2">
+            <a:extLst>
+              <a:ext uri="{28A0092B-C50C-407E-A947-70E740481C1C}">
+                <a14:useLocalDpi xmlns:a14="http://schemas.microsoft.com/office/drawing/2010/main" val="0"/>
+              </a:ext>
+            </a:extLst>
+          </a:blip>
+          <a:srcRect l="18677" r="15441"/>
+          <a:stretch/>
+        </p:blipFill>
+        <p:spPr bwMode="auto">
+          <a:xfrm>
+            <a:off x="143436" y="143435"/>
+            <a:ext cx="2269635" cy="609600"/>
+          </a:xfrm>
+          <a:prstGeom prst="rect">
+            <a:avLst/>
+          </a:prstGeom>
+          <a:noFill/>
+          <a:extLst>
+            <a:ext uri="{909E8E84-426E-40DD-AFC4-6F175D3DCCD1}">
+              <a14:hiddenFill xmlns:a14="http://schemas.microsoft.com/office/drawing/2010/main">
+                <a:solidFill>
+                  <a:srgbClr val="FFFFFF"/>
+                </a:solidFill>
+              </a14:hiddenFill>
+            </a:ext>
+          </a:extLst>
+        </p:spPr>
+      </p:pic>
+    </p:spTree>
+    <p:extLst>
+      <p:ext uri="{BB962C8B-B14F-4D97-AF65-F5344CB8AC3E}">
+        <p14:creationId xmlns:p14="http://schemas.microsoft.com/office/powerpoint/2010/main" val="779748466"/>
+      </p:ext>
+    </p:extLst>
+  </p:cSld>
+  <p:clrMapOvr>
+    <a:masterClrMapping/>
+  </p:clrMapOvr>
+  <mc:AlternateContent xmlns:mc="http://schemas.openxmlformats.org/markup-compatibility/2006" xmlns:p159="http://schemas.microsoft.com/office/powerpoint/2015/09/main">
+    <mc:Choice Requires="p159">
+      <p:transition xmlns:p14="http://schemas.microsoft.com/office/powerpoint/2010/main" spd="slow" p14:dur="2000">
+        <p159:morph option="byObject"/>
+      </p:transition>
+    </mc:Choice>
+    <mc:Fallback xmlns="">
+      <p:transition spd="slow">
+        <p:fade/>
+      </p:transition>
+    </mc:Fallback>
+  </mc:AlternateContent>
+</p:sld>
+</file>
+
 <file path=ppt/slides/slide2.xml><?xml version="1.0" encoding="utf-8"?>
 <p:sld xmlns:a="http://schemas.openxmlformats.org/drawingml/2006/main" xmlns:r="http://schemas.openxmlformats.org/officeDocument/2006/relationships" xmlns:p="http://schemas.openxmlformats.org/presentationml/2006/main">
   <p:cSld>
@@ -6944,6 +7240,185 @@
           </a:extLst>
         </p:spPr>
       </p:pic>
+      <p:sp>
+        <p:nvSpPr>
+          <p:cNvPr id="3" name="ZoneTexte 2">
+            <a:extLst>
+              <a:ext uri="{FF2B5EF4-FFF2-40B4-BE49-F238E27FC236}">
+                <a16:creationId xmlns:a16="http://schemas.microsoft.com/office/drawing/2014/main" id="{A865E19C-F420-4342-965A-397CFA370BDA}"/>
+              </a:ext>
+            </a:extLst>
+          </p:cNvPr>
+          <p:cNvSpPr txBox="1"/>
+          <p:nvPr/>
+        </p:nvSpPr>
+        <p:spPr>
+          <a:xfrm>
+            <a:off x="2816352" y="143435"/>
+            <a:ext cx="5342576" cy="646331"/>
+          </a:xfrm>
+          <a:prstGeom prst="rect">
+            <a:avLst/>
+          </a:prstGeom>
+          <a:noFill/>
+          <a:ln>
+            <a:noFill/>
+          </a:ln>
+          <a:effectLst>
+            <a:glow rad="63500">
+              <a:schemeClr val="accent4">
+                <a:satMod val="175000"/>
+                <a:alpha val="40000"/>
+              </a:schemeClr>
+            </a:glow>
+            <a:outerShdw blurRad="50800" dist="38100" dir="5400000" algn="t" rotWithShape="0">
+              <a:prstClr val="black">
+                <a:alpha val="40000"/>
+              </a:prstClr>
+            </a:outerShdw>
+          </a:effectLst>
+          <a:scene3d>
+            <a:camera prst="orthographicFront">
+              <a:rot lat="0" lon="0" rev="0"/>
+            </a:camera>
+            <a:lightRig rig="soft" dir="t">
+              <a:rot lat="0" lon="0" rev="0"/>
+            </a:lightRig>
+          </a:scene3d>
+          <a:sp3d contourW="44450" prstMaterial="matte">
+            <a:bevelT w="63500" h="63500" prst="artDeco"/>
+            <a:contourClr>
+              <a:srgbClr val="FFFFFF"/>
+            </a:contourClr>
+          </a:sp3d>
+        </p:spPr>
+        <p:txBody>
+          <a:bodyPr wrap="square" rtlCol="0">
+            <a:spAutoFit/>
+          </a:bodyPr>
+          <a:lstStyle/>
+          <a:p>
+            <a:pPr algn="ctr"/>
+            <a:r>
+              <a:rPr lang="fr-FR" sz="3600" b="1" dirty="0">
+                <a:latin typeface="Eras Medium ITC" panose="020B0602030504020804" pitchFamily="34" charset="0"/>
+              </a:rPr>
+              <a:t>Déroulement :</a:t>
+            </a:r>
+            <a:endParaRPr lang="fr-FR" sz="3200" b="1" dirty="0">
+              <a:latin typeface="Eras Medium ITC" panose="020B0602030504020804" pitchFamily="34" charset="0"/>
+            </a:endParaRPr>
+          </a:p>
+        </p:txBody>
+      </p:sp>
+      <p:sp>
+        <p:nvSpPr>
+          <p:cNvPr id="2" name="ZoneTexte 1">
+            <a:extLst>
+              <a:ext uri="{FF2B5EF4-FFF2-40B4-BE49-F238E27FC236}">
+                <a16:creationId xmlns:a16="http://schemas.microsoft.com/office/drawing/2014/main" id="{FB1E84CE-9DB5-4FA0-BDF7-9F51DDB210EA}"/>
+              </a:ext>
+            </a:extLst>
+          </p:cNvPr>
+          <p:cNvSpPr txBox="1"/>
+          <p:nvPr/>
+        </p:nvSpPr>
+        <p:spPr>
+          <a:xfrm>
+            <a:off x="1051560" y="1307592"/>
+            <a:ext cx="4754880" cy="2308324"/>
+          </a:xfrm>
+          <a:prstGeom prst="rect">
+            <a:avLst/>
+          </a:prstGeom>
+          <a:noFill/>
+        </p:spPr>
+        <p:txBody>
+          <a:bodyPr wrap="square" rtlCol="0">
+            <a:spAutoFit/>
+          </a:bodyPr>
+          <a:lstStyle/>
+          <a:p>
+            <a:pPr marL="285750" indent="-285750">
+              <a:buFontTx/>
+              <a:buChar char="-"/>
+            </a:pPr>
+            <a:r>
+              <a:rPr lang="fr-FR" dirty="0"/>
+              <a:t>Présentation du projet</a:t>
+            </a:r>
+          </a:p>
+          <a:p>
+            <a:pPr marL="285750" indent="-285750">
+              <a:buFontTx/>
+              <a:buChar char="-"/>
+            </a:pPr>
+            <a:r>
+              <a:rPr lang="fr-FR" dirty="0"/>
+              <a:t>Schématisation globale du projet</a:t>
+            </a:r>
+          </a:p>
+          <a:p>
+            <a:pPr marL="285750" indent="-285750">
+              <a:buFontTx/>
+              <a:buChar char="-"/>
+            </a:pPr>
+            <a:r>
+              <a:rPr lang="fr-FR" dirty="0"/>
+              <a:t>Tâches personnelles</a:t>
+            </a:r>
+          </a:p>
+          <a:p>
+            <a:pPr marL="285750" indent="-285750">
+              <a:buFontTx/>
+              <a:buChar char="-"/>
+            </a:pPr>
+            <a:r>
+              <a:rPr lang="fr-FR" dirty="0"/>
+              <a:t>Diagramme de cas d’utilisation</a:t>
+            </a:r>
+          </a:p>
+          <a:p>
+            <a:pPr marL="285750" indent="-285750">
+              <a:buFontTx/>
+              <a:buChar char="-"/>
+            </a:pPr>
+            <a:r>
+              <a:rPr lang="fr-FR" dirty="0"/>
+              <a:t>Diagramme de séquence</a:t>
+            </a:r>
+          </a:p>
+          <a:p>
+            <a:pPr marL="285750" indent="-285750">
+              <a:buFontTx/>
+              <a:buChar char="-"/>
+            </a:pPr>
+            <a:r>
+              <a:rPr lang="fr-FR" dirty="0"/>
+              <a:t>Schéma </a:t>
+            </a:r>
+            <a:r>
+              <a:rPr lang="fr-FR"/>
+              <a:t>du réseau</a:t>
+            </a:r>
+            <a:endParaRPr lang="fr-FR" dirty="0"/>
+          </a:p>
+          <a:p>
+            <a:pPr marL="285750" indent="-285750">
+              <a:buFontTx/>
+              <a:buChar char="-"/>
+            </a:pPr>
+            <a:endParaRPr lang="fr-FR" dirty="0"/>
+          </a:p>
+          <a:p>
+            <a:pPr marL="285750" indent="-285750">
+              <a:buFontTx/>
+              <a:buChar char="-"/>
+            </a:pPr>
+            <a:endParaRPr lang="fr-FR" dirty="0"/>
+          </a:p>
+        </p:txBody>
+      </p:sp>
     </p:spTree>
     <p:extLst>
       <p:ext uri="{BB962C8B-B14F-4D97-AF65-F5344CB8AC3E}">
@@ -7031,6 +7506,77 @@
           </a:extLst>
         </p:spPr>
       </p:pic>
+      <p:sp>
+        <p:nvSpPr>
+          <p:cNvPr id="3" name="ZoneTexte 2">
+            <a:extLst>
+              <a:ext uri="{FF2B5EF4-FFF2-40B4-BE49-F238E27FC236}">
+                <a16:creationId xmlns:a16="http://schemas.microsoft.com/office/drawing/2014/main" id="{B96BB06C-BC51-4BDC-8D2F-B2AAB8BAEFC0}"/>
+              </a:ext>
+            </a:extLst>
+          </p:cNvPr>
+          <p:cNvSpPr txBox="1"/>
+          <p:nvPr/>
+        </p:nvSpPr>
+        <p:spPr>
+          <a:xfrm>
+            <a:off x="2816352" y="143435"/>
+            <a:ext cx="5342576" cy="646331"/>
+          </a:xfrm>
+          <a:prstGeom prst="rect">
+            <a:avLst/>
+          </a:prstGeom>
+          <a:noFill/>
+          <a:ln>
+            <a:noFill/>
+          </a:ln>
+          <a:effectLst>
+            <a:glow rad="63500">
+              <a:schemeClr val="accent4">
+                <a:satMod val="175000"/>
+                <a:alpha val="40000"/>
+              </a:schemeClr>
+            </a:glow>
+            <a:outerShdw blurRad="50800" dist="38100" dir="5400000" algn="t" rotWithShape="0">
+              <a:prstClr val="black">
+                <a:alpha val="40000"/>
+              </a:prstClr>
+            </a:outerShdw>
+          </a:effectLst>
+          <a:scene3d>
+            <a:camera prst="orthographicFront">
+              <a:rot lat="0" lon="0" rev="0"/>
+            </a:camera>
+            <a:lightRig rig="soft" dir="t">
+              <a:rot lat="0" lon="0" rev="0"/>
+            </a:lightRig>
+          </a:scene3d>
+          <a:sp3d contourW="44450" prstMaterial="matte">
+            <a:bevelT w="63500" h="63500" prst="artDeco"/>
+            <a:contourClr>
+              <a:srgbClr val="FFFFFF"/>
+            </a:contourClr>
+          </a:sp3d>
+        </p:spPr>
+        <p:txBody>
+          <a:bodyPr wrap="square" rtlCol="0">
+            <a:spAutoFit/>
+          </a:bodyPr>
+          <a:lstStyle/>
+          <a:p>
+            <a:pPr algn="ctr"/>
+            <a:r>
+              <a:rPr lang="fr-FR" sz="3600" b="1" dirty="0">
+                <a:latin typeface="Eras Medium ITC" panose="020B0602030504020804" pitchFamily="34" charset="0"/>
+              </a:rPr>
+              <a:t>Présentation du projet :</a:t>
+            </a:r>
+            <a:endParaRPr lang="fr-FR" sz="3200" b="1" dirty="0">
+              <a:latin typeface="Eras Medium ITC" panose="020B0602030504020804" pitchFamily="34" charset="0"/>
+            </a:endParaRPr>
+          </a:p>
+        </p:txBody>
+      </p:sp>
     </p:spTree>
     <p:extLst>
       <p:ext uri="{BB962C8B-B14F-4D97-AF65-F5344CB8AC3E}">
@@ -7116,6 +7662,121 @@
               </a14:hiddenFill>
             </a:ext>
           </a:extLst>
+        </p:spPr>
+      </p:pic>
+      <p:sp>
+        <p:nvSpPr>
+          <p:cNvPr id="3" name="ZoneTexte 2">
+            <a:extLst>
+              <a:ext uri="{FF2B5EF4-FFF2-40B4-BE49-F238E27FC236}">
+                <a16:creationId xmlns:a16="http://schemas.microsoft.com/office/drawing/2014/main" id="{710E88E4-C59A-4F33-A331-17F09767646F}"/>
+              </a:ext>
+            </a:extLst>
+          </p:cNvPr>
+          <p:cNvSpPr txBox="1"/>
+          <p:nvPr/>
+        </p:nvSpPr>
+        <p:spPr>
+          <a:xfrm>
+            <a:off x="2816352" y="143435"/>
+            <a:ext cx="5342576" cy="646331"/>
+          </a:xfrm>
+          <a:prstGeom prst="rect">
+            <a:avLst/>
+          </a:prstGeom>
+          <a:noFill/>
+          <a:ln>
+            <a:noFill/>
+          </a:ln>
+          <a:effectLst>
+            <a:glow rad="63500">
+              <a:schemeClr val="accent4">
+                <a:satMod val="175000"/>
+                <a:alpha val="40000"/>
+              </a:schemeClr>
+            </a:glow>
+            <a:outerShdw blurRad="50800" dist="38100" dir="5400000" algn="t" rotWithShape="0">
+              <a:prstClr val="black">
+                <a:alpha val="40000"/>
+              </a:prstClr>
+            </a:outerShdw>
+          </a:effectLst>
+          <a:scene3d>
+            <a:camera prst="orthographicFront">
+              <a:rot lat="0" lon="0" rev="0"/>
+            </a:camera>
+            <a:lightRig rig="soft" dir="t">
+              <a:rot lat="0" lon="0" rev="0"/>
+            </a:lightRig>
+          </a:scene3d>
+          <a:sp3d contourW="44450" prstMaterial="matte">
+            <a:bevelT w="63500" h="63500" prst="artDeco"/>
+            <a:contourClr>
+              <a:srgbClr val="FFFFFF"/>
+            </a:contourClr>
+          </a:sp3d>
+        </p:spPr>
+        <p:txBody>
+          <a:bodyPr wrap="square" rtlCol="0">
+            <a:spAutoFit/>
+          </a:bodyPr>
+          <a:lstStyle/>
+          <a:p>
+            <a:pPr algn="ctr"/>
+            <a:r>
+              <a:rPr lang="fr-FR" sz="3600" b="1" dirty="0">
+                <a:latin typeface="Eras Medium ITC" panose="020B0602030504020804" pitchFamily="34" charset="0"/>
+              </a:rPr>
+              <a:t>Schématisation </a:t>
+            </a:r>
+            <a:r>
+              <a:rPr lang="fr-FR" sz="3600" b="1" dirty="0">
+                <a:solidFill>
+                  <a:srgbClr val="A41258"/>
+                </a:solidFill>
+                <a:latin typeface="Eras Medium ITC" panose="020B0602030504020804" pitchFamily="34" charset="0"/>
+              </a:rPr>
+              <a:t>globale</a:t>
+            </a:r>
+            <a:r>
+              <a:rPr lang="fr-FR" sz="3600" b="1" dirty="0">
+                <a:latin typeface="Eras Medium ITC" panose="020B0602030504020804" pitchFamily="34" charset="0"/>
+              </a:rPr>
+              <a:t> :</a:t>
+            </a:r>
+            <a:endParaRPr lang="fr-FR" sz="3200" b="1" dirty="0">
+              <a:latin typeface="Eras Medium ITC" panose="020B0602030504020804" pitchFamily="34" charset="0"/>
+            </a:endParaRPr>
+          </a:p>
+        </p:txBody>
+      </p:sp>
+      <p:pic>
+        <p:nvPicPr>
+          <p:cNvPr id="2" name="Image 1">
+            <a:extLst>
+              <a:ext uri="{FF2B5EF4-FFF2-40B4-BE49-F238E27FC236}">
+                <a16:creationId xmlns:a16="http://schemas.microsoft.com/office/drawing/2014/main" id="{D297602B-3888-4148-A07F-260085A43925}"/>
+              </a:ext>
+            </a:extLst>
+          </p:cNvPr>
+          <p:cNvPicPr>
+            <a:picLocks noChangeAspect="1"/>
+          </p:cNvPicPr>
+          <p:nvPr/>
+        </p:nvPicPr>
+        <p:blipFill rotWithShape="1">
+          <a:blip r:embed="rId3"/>
+          <a:srcRect t="4170"/>
+          <a:stretch/>
+        </p:blipFill>
+        <p:spPr>
+          <a:xfrm>
+            <a:off x="0" y="943696"/>
+            <a:ext cx="8954429" cy="5914304"/>
+          </a:xfrm>
+          <a:prstGeom prst="rect">
+            <a:avLst/>
+          </a:prstGeom>
         </p:spPr>
       </p:pic>
     </p:spTree>
@@ -7205,10 +7866,881 @@
           </a:extLst>
         </p:spPr>
       </p:pic>
+      <p:sp>
+        <p:nvSpPr>
+          <p:cNvPr id="3" name="ZoneTexte 2">
+            <a:extLst>
+              <a:ext uri="{FF2B5EF4-FFF2-40B4-BE49-F238E27FC236}">
+                <a16:creationId xmlns:a16="http://schemas.microsoft.com/office/drawing/2014/main" id="{B471CF48-6047-4FC0-80B5-834C802D9B1F}"/>
+              </a:ext>
+            </a:extLst>
+          </p:cNvPr>
+          <p:cNvSpPr txBox="1"/>
+          <p:nvPr/>
+        </p:nvSpPr>
+        <p:spPr>
+          <a:xfrm>
+            <a:off x="2816352" y="143435"/>
+            <a:ext cx="5342576" cy="646331"/>
+          </a:xfrm>
+          <a:prstGeom prst="rect">
+            <a:avLst/>
+          </a:prstGeom>
+          <a:noFill/>
+          <a:ln>
+            <a:noFill/>
+          </a:ln>
+          <a:effectLst>
+            <a:glow rad="63500">
+              <a:schemeClr val="accent4">
+                <a:satMod val="175000"/>
+                <a:alpha val="40000"/>
+              </a:schemeClr>
+            </a:glow>
+            <a:outerShdw blurRad="50800" dist="38100" dir="5400000" algn="t" rotWithShape="0">
+              <a:prstClr val="black">
+                <a:alpha val="40000"/>
+              </a:prstClr>
+            </a:outerShdw>
+          </a:effectLst>
+          <a:scene3d>
+            <a:camera prst="orthographicFront">
+              <a:rot lat="0" lon="0" rev="0"/>
+            </a:camera>
+            <a:lightRig rig="soft" dir="t">
+              <a:rot lat="0" lon="0" rev="0"/>
+            </a:lightRig>
+          </a:scene3d>
+          <a:sp3d contourW="44450" prstMaterial="matte">
+            <a:bevelT w="63500" h="63500" prst="artDeco"/>
+            <a:contourClr>
+              <a:srgbClr val="FFFFFF"/>
+            </a:contourClr>
+          </a:sp3d>
+        </p:spPr>
+        <p:txBody>
+          <a:bodyPr wrap="square" rtlCol="0">
+            <a:spAutoFit/>
+          </a:bodyPr>
+          <a:lstStyle/>
+          <a:p>
+            <a:pPr algn="ctr"/>
+            <a:r>
+              <a:rPr lang="fr-FR" sz="3600" b="1" dirty="0">
+                <a:latin typeface="Eras Medium ITC" panose="020B0602030504020804" pitchFamily="34" charset="0"/>
+              </a:rPr>
+              <a:t>Tâches personnelles :</a:t>
+            </a:r>
+            <a:endParaRPr lang="fr-FR" sz="3200" b="1" dirty="0">
+              <a:latin typeface="Eras Medium ITC" panose="020B0602030504020804" pitchFamily="34" charset="0"/>
+            </a:endParaRPr>
+          </a:p>
+        </p:txBody>
+      </p:sp>
     </p:spTree>
     <p:extLst>
       <p:ext uri="{BB962C8B-B14F-4D97-AF65-F5344CB8AC3E}">
         <p14:creationId xmlns:p14="http://schemas.microsoft.com/office/powerpoint/2010/main" val="3328809043"/>
+      </p:ext>
+    </p:extLst>
+  </p:cSld>
+  <p:clrMapOvr>
+    <a:masterClrMapping/>
+  </p:clrMapOvr>
+  <mc:AlternateContent xmlns:mc="http://schemas.openxmlformats.org/markup-compatibility/2006" xmlns:p159="http://schemas.microsoft.com/office/powerpoint/2015/09/main">
+    <mc:Choice Requires="p159">
+      <p:transition xmlns:p14="http://schemas.microsoft.com/office/powerpoint/2010/main" spd="slow" p14:dur="2000">
+        <p159:morph option="byObject"/>
+      </p:transition>
+    </mc:Choice>
+    <mc:Fallback xmlns="">
+      <p:transition spd="slow">
+        <p:fade/>
+      </p:transition>
+    </mc:Fallback>
+  </mc:AlternateContent>
+</p:sld>
+</file>
+
+<file path=ppt/slides/slide6.xml><?xml version="1.0" encoding="utf-8"?>
+<p:sld xmlns:a="http://schemas.openxmlformats.org/drawingml/2006/main" xmlns:r="http://schemas.openxmlformats.org/officeDocument/2006/relationships" xmlns:p="http://schemas.openxmlformats.org/presentationml/2006/main">
+  <p:cSld>
+    <p:spTree>
+      <p:nvGrpSpPr>
+        <p:cNvPr id="1" name=""/>
+        <p:cNvGrpSpPr/>
+        <p:nvPr/>
+      </p:nvGrpSpPr>
+      <p:grpSpPr>
+        <a:xfrm>
+          <a:off x="0" y="0"/>
+          <a:ext cx="0" cy="0"/>
+          <a:chOff x="0" y="0"/>
+          <a:chExt cx="0" cy="0"/>
+        </a:xfrm>
+      </p:grpSpPr>
+      <p:pic>
+        <p:nvPicPr>
+          <p:cNvPr id="1026" name="Picture 2" descr="Image associée">
+            <a:extLst>
+              <a:ext uri="{FF2B5EF4-FFF2-40B4-BE49-F238E27FC236}">
+                <a16:creationId xmlns:a16="http://schemas.microsoft.com/office/drawing/2014/main" id="{C816F3D8-CC4C-46B3-A21E-58AE9AD30454}"/>
+              </a:ext>
+            </a:extLst>
+          </p:cNvPr>
+          <p:cNvPicPr>
+            <a:picLocks noChangeAspect="1" noChangeArrowheads="1"/>
+          </p:cNvPicPr>
+          <p:nvPr/>
+        </p:nvPicPr>
+        <p:blipFill rotWithShape="1">
+          <a:blip r:embed="rId2">
+            <a:extLst>
+              <a:ext uri="{28A0092B-C50C-407E-A947-70E740481C1C}">
+                <a14:useLocalDpi xmlns:a14="http://schemas.microsoft.com/office/drawing/2010/main" val="0"/>
+              </a:ext>
+            </a:extLst>
+          </a:blip>
+          <a:srcRect l="18677" r="15441"/>
+          <a:stretch/>
+        </p:blipFill>
+        <p:spPr bwMode="auto">
+          <a:xfrm>
+            <a:off x="143436" y="143435"/>
+            <a:ext cx="2269635" cy="609600"/>
+          </a:xfrm>
+          <a:prstGeom prst="rect">
+            <a:avLst/>
+          </a:prstGeom>
+          <a:noFill/>
+          <a:extLst>
+            <a:ext uri="{909E8E84-426E-40DD-AFC4-6F175D3DCCD1}">
+              <a14:hiddenFill xmlns:a14="http://schemas.microsoft.com/office/drawing/2010/main">
+                <a:solidFill>
+                  <a:srgbClr val="FFFFFF"/>
+                </a:solidFill>
+              </a14:hiddenFill>
+            </a:ext>
+          </a:extLst>
+        </p:spPr>
+      </p:pic>
+      <p:sp>
+        <p:nvSpPr>
+          <p:cNvPr id="3" name="ZoneTexte 2">
+            <a:extLst>
+              <a:ext uri="{FF2B5EF4-FFF2-40B4-BE49-F238E27FC236}">
+                <a16:creationId xmlns:a16="http://schemas.microsoft.com/office/drawing/2014/main" id="{B471CF48-6047-4FC0-80B5-834C802D9B1F}"/>
+              </a:ext>
+            </a:extLst>
+          </p:cNvPr>
+          <p:cNvSpPr txBox="1"/>
+          <p:nvPr/>
+        </p:nvSpPr>
+        <p:spPr>
+          <a:xfrm>
+            <a:off x="2413071" y="143435"/>
+            <a:ext cx="6630345" cy="1077218"/>
+          </a:xfrm>
+          <a:prstGeom prst="rect">
+            <a:avLst/>
+          </a:prstGeom>
+          <a:noFill/>
+          <a:ln>
+            <a:noFill/>
+          </a:ln>
+          <a:effectLst>
+            <a:glow rad="63500">
+              <a:schemeClr val="accent4">
+                <a:satMod val="175000"/>
+                <a:alpha val="40000"/>
+              </a:schemeClr>
+            </a:glow>
+            <a:outerShdw blurRad="50800" dist="38100" dir="5400000" algn="t" rotWithShape="0">
+              <a:prstClr val="black">
+                <a:alpha val="40000"/>
+              </a:prstClr>
+            </a:outerShdw>
+          </a:effectLst>
+          <a:scene3d>
+            <a:camera prst="orthographicFront">
+              <a:rot lat="0" lon="0" rev="0"/>
+            </a:camera>
+            <a:lightRig rig="soft" dir="t">
+              <a:rot lat="0" lon="0" rev="0"/>
+            </a:lightRig>
+          </a:scene3d>
+          <a:sp3d contourW="44450" prstMaterial="matte">
+            <a:bevelT w="63500" h="63500" prst="artDeco"/>
+            <a:contourClr>
+              <a:srgbClr val="FFFFFF"/>
+            </a:contourClr>
+          </a:sp3d>
+        </p:spPr>
+        <p:txBody>
+          <a:bodyPr wrap="square" rtlCol="0">
+            <a:spAutoFit/>
+          </a:bodyPr>
+          <a:lstStyle/>
+          <a:p>
+            <a:pPr algn="ctr"/>
+            <a:r>
+              <a:rPr lang="fr-FR" sz="3600" b="1" dirty="0">
+                <a:latin typeface="Eras Medium ITC" panose="020B0602030504020804" pitchFamily="34" charset="0"/>
+              </a:rPr>
+              <a:t>Diagramme de cas d’utilisation : </a:t>
+            </a:r>
+            <a:r>
+              <a:rPr lang="fr-FR" sz="2800" b="1" dirty="0">
+                <a:solidFill>
+                  <a:srgbClr val="A41258"/>
+                </a:solidFill>
+                <a:latin typeface="Eras Medium ITC" panose="020B0602030504020804" pitchFamily="34" charset="0"/>
+              </a:rPr>
+              <a:t>Global</a:t>
+            </a:r>
+            <a:endParaRPr lang="fr-FR" sz="3200" b="1" dirty="0">
+              <a:solidFill>
+                <a:srgbClr val="A41258"/>
+              </a:solidFill>
+              <a:latin typeface="Eras Medium ITC" panose="020B0602030504020804" pitchFamily="34" charset="0"/>
+            </a:endParaRPr>
+          </a:p>
+        </p:txBody>
+      </p:sp>
+      <p:pic>
+        <p:nvPicPr>
+          <p:cNvPr id="2" name="Image 1">
+            <a:extLst>
+              <a:ext uri="{FF2B5EF4-FFF2-40B4-BE49-F238E27FC236}">
+                <a16:creationId xmlns:a16="http://schemas.microsoft.com/office/drawing/2014/main" id="{90A51D8C-DBCC-4AC6-9EC6-E9B6237A0F66}"/>
+              </a:ext>
+            </a:extLst>
+          </p:cNvPr>
+          <p:cNvPicPr>
+            <a:picLocks noChangeAspect="1"/>
+          </p:cNvPicPr>
+          <p:nvPr/>
+        </p:nvPicPr>
+        <p:blipFill>
+          <a:blip r:embed="rId3"/>
+          <a:stretch>
+            <a:fillRect/>
+          </a:stretch>
+        </p:blipFill>
+        <p:spPr>
+          <a:xfrm>
+            <a:off x="2103443" y="1115122"/>
+            <a:ext cx="5238849" cy="5742878"/>
+          </a:xfrm>
+          <a:prstGeom prst="rect">
+            <a:avLst/>
+          </a:prstGeom>
+        </p:spPr>
+      </p:pic>
+    </p:spTree>
+    <p:extLst>
+      <p:ext uri="{BB962C8B-B14F-4D97-AF65-F5344CB8AC3E}">
+        <p14:creationId xmlns:p14="http://schemas.microsoft.com/office/powerpoint/2010/main" val="3306364669"/>
+      </p:ext>
+    </p:extLst>
+  </p:cSld>
+  <p:clrMapOvr>
+    <a:masterClrMapping/>
+  </p:clrMapOvr>
+  <mc:AlternateContent xmlns:mc="http://schemas.openxmlformats.org/markup-compatibility/2006" xmlns:p159="http://schemas.microsoft.com/office/powerpoint/2015/09/main">
+    <mc:Choice Requires="p159">
+      <p:transition xmlns:p14="http://schemas.microsoft.com/office/powerpoint/2010/main" spd="slow" p14:dur="2000">
+        <p159:morph option="byObject"/>
+      </p:transition>
+    </mc:Choice>
+    <mc:Fallback xmlns="">
+      <p:transition spd="slow">
+        <p:fade/>
+      </p:transition>
+    </mc:Fallback>
+  </mc:AlternateContent>
+</p:sld>
+</file>
+
+<file path=ppt/slides/slide7.xml><?xml version="1.0" encoding="utf-8"?>
+<p:sld xmlns:a="http://schemas.openxmlformats.org/drawingml/2006/main" xmlns:r="http://schemas.openxmlformats.org/officeDocument/2006/relationships" xmlns:p="http://schemas.openxmlformats.org/presentationml/2006/main">
+  <p:cSld>
+    <p:spTree>
+      <p:nvGrpSpPr>
+        <p:cNvPr id="1" name=""/>
+        <p:cNvGrpSpPr/>
+        <p:nvPr/>
+      </p:nvGrpSpPr>
+      <p:grpSpPr>
+        <a:xfrm>
+          <a:off x="0" y="0"/>
+          <a:ext cx="0" cy="0"/>
+          <a:chOff x="0" y="0"/>
+          <a:chExt cx="0" cy="0"/>
+        </a:xfrm>
+      </p:grpSpPr>
+      <p:pic>
+        <p:nvPicPr>
+          <p:cNvPr id="1026" name="Picture 2" descr="Image associée">
+            <a:extLst>
+              <a:ext uri="{FF2B5EF4-FFF2-40B4-BE49-F238E27FC236}">
+                <a16:creationId xmlns:a16="http://schemas.microsoft.com/office/drawing/2014/main" id="{C816F3D8-CC4C-46B3-A21E-58AE9AD30454}"/>
+              </a:ext>
+            </a:extLst>
+          </p:cNvPr>
+          <p:cNvPicPr>
+            <a:picLocks noChangeAspect="1" noChangeArrowheads="1"/>
+          </p:cNvPicPr>
+          <p:nvPr/>
+        </p:nvPicPr>
+        <p:blipFill rotWithShape="1">
+          <a:blip r:embed="rId2">
+            <a:extLst>
+              <a:ext uri="{28A0092B-C50C-407E-A947-70E740481C1C}">
+                <a14:useLocalDpi xmlns:a14="http://schemas.microsoft.com/office/drawing/2010/main" val="0"/>
+              </a:ext>
+            </a:extLst>
+          </a:blip>
+          <a:srcRect l="18677" r="15441"/>
+          <a:stretch/>
+        </p:blipFill>
+        <p:spPr bwMode="auto">
+          <a:xfrm>
+            <a:off x="143436" y="143435"/>
+            <a:ext cx="2269635" cy="609600"/>
+          </a:xfrm>
+          <a:prstGeom prst="rect">
+            <a:avLst/>
+          </a:prstGeom>
+          <a:noFill/>
+          <a:extLst>
+            <a:ext uri="{909E8E84-426E-40DD-AFC4-6F175D3DCCD1}">
+              <a14:hiddenFill xmlns:a14="http://schemas.microsoft.com/office/drawing/2010/main">
+                <a:solidFill>
+                  <a:srgbClr val="FFFFFF"/>
+                </a:solidFill>
+              </a14:hiddenFill>
+            </a:ext>
+          </a:extLst>
+        </p:spPr>
+      </p:pic>
+      <p:sp>
+        <p:nvSpPr>
+          <p:cNvPr id="3" name="ZoneTexte 2">
+            <a:extLst>
+              <a:ext uri="{FF2B5EF4-FFF2-40B4-BE49-F238E27FC236}">
+                <a16:creationId xmlns:a16="http://schemas.microsoft.com/office/drawing/2014/main" id="{16637F4C-A45D-4A64-84F7-746FFFD316BB}"/>
+              </a:ext>
+            </a:extLst>
+          </p:cNvPr>
+          <p:cNvSpPr txBox="1"/>
+          <p:nvPr/>
+        </p:nvSpPr>
+        <p:spPr>
+          <a:xfrm>
+            <a:off x="2816352" y="143435"/>
+            <a:ext cx="5897880" cy="1077218"/>
+          </a:xfrm>
+          <a:prstGeom prst="rect">
+            <a:avLst/>
+          </a:prstGeom>
+          <a:noFill/>
+          <a:ln>
+            <a:noFill/>
+          </a:ln>
+          <a:effectLst>
+            <a:glow rad="63500">
+              <a:schemeClr val="accent4">
+                <a:satMod val="175000"/>
+                <a:alpha val="40000"/>
+              </a:schemeClr>
+            </a:glow>
+            <a:outerShdw blurRad="50800" dist="38100" dir="5400000" algn="t" rotWithShape="0">
+              <a:prstClr val="black">
+                <a:alpha val="40000"/>
+              </a:prstClr>
+            </a:outerShdw>
+          </a:effectLst>
+          <a:scene3d>
+            <a:camera prst="orthographicFront">
+              <a:rot lat="0" lon="0" rev="0"/>
+            </a:camera>
+            <a:lightRig rig="soft" dir="t">
+              <a:rot lat="0" lon="0" rev="0"/>
+            </a:lightRig>
+          </a:scene3d>
+          <a:sp3d contourW="44450" prstMaterial="matte">
+            <a:bevelT w="63500" h="63500" prst="artDeco"/>
+            <a:contourClr>
+              <a:srgbClr val="FFFFFF"/>
+            </a:contourClr>
+          </a:sp3d>
+        </p:spPr>
+        <p:txBody>
+          <a:bodyPr wrap="square" rtlCol="0">
+            <a:spAutoFit/>
+          </a:bodyPr>
+          <a:lstStyle/>
+          <a:p>
+            <a:pPr algn="ctr"/>
+            <a:r>
+              <a:rPr lang="fr-FR" sz="3600" b="1" dirty="0">
+                <a:latin typeface="Eras Medium ITC" panose="020B0602030504020804" pitchFamily="34" charset="0"/>
+              </a:rPr>
+              <a:t>Diagramme de séquence : </a:t>
+            </a:r>
+            <a:r>
+              <a:rPr lang="fr-FR" sz="2800" b="1" dirty="0">
+                <a:solidFill>
+                  <a:srgbClr val="A41258"/>
+                </a:solidFill>
+                <a:latin typeface="Eras Medium ITC" panose="020B0602030504020804" pitchFamily="34" charset="0"/>
+              </a:rPr>
+              <a:t>Lancement d’une partie</a:t>
+            </a:r>
+            <a:endParaRPr lang="fr-FR" sz="3200" b="1" dirty="0">
+              <a:solidFill>
+                <a:srgbClr val="A41258"/>
+              </a:solidFill>
+              <a:latin typeface="Eras Medium ITC" panose="020B0602030504020804" pitchFamily="34" charset="0"/>
+            </a:endParaRPr>
+          </a:p>
+        </p:txBody>
+      </p:sp>
+      <p:pic>
+        <p:nvPicPr>
+          <p:cNvPr id="2" name="Image 1">
+            <a:extLst>
+              <a:ext uri="{FF2B5EF4-FFF2-40B4-BE49-F238E27FC236}">
+                <a16:creationId xmlns:a16="http://schemas.microsoft.com/office/drawing/2014/main" id="{99A0B900-94D3-44A9-A462-A4EE245E8216}"/>
+              </a:ext>
+            </a:extLst>
+          </p:cNvPr>
+          <p:cNvPicPr>
+            <a:picLocks noChangeAspect="1"/>
+          </p:cNvPicPr>
+          <p:nvPr/>
+        </p:nvPicPr>
+        <p:blipFill>
+          <a:blip r:embed="rId3"/>
+          <a:stretch>
+            <a:fillRect/>
+          </a:stretch>
+        </p:blipFill>
+        <p:spPr>
+          <a:xfrm>
+            <a:off x="410147" y="1220653"/>
+            <a:ext cx="8624126" cy="5547092"/>
+          </a:xfrm>
+          <a:prstGeom prst="rect">
+            <a:avLst/>
+          </a:prstGeom>
+        </p:spPr>
+      </p:pic>
+    </p:spTree>
+    <p:extLst>
+      <p:ext uri="{BB962C8B-B14F-4D97-AF65-F5344CB8AC3E}">
+        <p14:creationId xmlns:p14="http://schemas.microsoft.com/office/powerpoint/2010/main" val="1236978261"/>
+      </p:ext>
+    </p:extLst>
+  </p:cSld>
+  <p:clrMapOvr>
+    <a:masterClrMapping/>
+  </p:clrMapOvr>
+  <mc:AlternateContent xmlns:mc="http://schemas.openxmlformats.org/markup-compatibility/2006" xmlns:p159="http://schemas.microsoft.com/office/powerpoint/2015/09/main">
+    <mc:Choice Requires="p159">
+      <p:transition xmlns:p14="http://schemas.microsoft.com/office/powerpoint/2010/main" spd="slow" p14:dur="2000">
+        <p159:morph option="byObject"/>
+      </p:transition>
+    </mc:Choice>
+    <mc:Fallback xmlns="">
+      <p:transition spd="slow">
+        <p:fade/>
+      </p:transition>
+    </mc:Fallback>
+  </mc:AlternateContent>
+</p:sld>
+</file>
+
+<file path=ppt/slides/slide8.xml><?xml version="1.0" encoding="utf-8"?>
+<p:sld xmlns:a="http://schemas.openxmlformats.org/drawingml/2006/main" xmlns:r="http://schemas.openxmlformats.org/officeDocument/2006/relationships" xmlns:p="http://schemas.openxmlformats.org/presentationml/2006/main">
+  <p:cSld>
+    <p:spTree>
+      <p:nvGrpSpPr>
+        <p:cNvPr id="1" name=""/>
+        <p:cNvGrpSpPr/>
+        <p:nvPr/>
+      </p:nvGrpSpPr>
+      <p:grpSpPr>
+        <a:xfrm>
+          <a:off x="0" y="0"/>
+          <a:ext cx="0" cy="0"/>
+          <a:chOff x="0" y="0"/>
+          <a:chExt cx="0" cy="0"/>
+        </a:xfrm>
+      </p:grpSpPr>
+      <p:pic>
+        <p:nvPicPr>
+          <p:cNvPr id="1026" name="Picture 2" descr="Image associée">
+            <a:extLst>
+              <a:ext uri="{FF2B5EF4-FFF2-40B4-BE49-F238E27FC236}">
+                <a16:creationId xmlns:a16="http://schemas.microsoft.com/office/drawing/2014/main" id="{C816F3D8-CC4C-46B3-A21E-58AE9AD30454}"/>
+              </a:ext>
+            </a:extLst>
+          </p:cNvPr>
+          <p:cNvPicPr>
+            <a:picLocks noChangeAspect="1" noChangeArrowheads="1"/>
+          </p:cNvPicPr>
+          <p:nvPr/>
+        </p:nvPicPr>
+        <p:blipFill rotWithShape="1">
+          <a:blip r:embed="rId2">
+            <a:extLst>
+              <a:ext uri="{28A0092B-C50C-407E-A947-70E740481C1C}">
+                <a14:useLocalDpi xmlns:a14="http://schemas.microsoft.com/office/drawing/2010/main" val="0"/>
+              </a:ext>
+            </a:extLst>
+          </a:blip>
+          <a:srcRect l="18677" r="15441"/>
+          <a:stretch/>
+        </p:blipFill>
+        <p:spPr bwMode="auto">
+          <a:xfrm>
+            <a:off x="143436" y="143435"/>
+            <a:ext cx="2269635" cy="609600"/>
+          </a:xfrm>
+          <a:prstGeom prst="rect">
+            <a:avLst/>
+          </a:prstGeom>
+          <a:noFill/>
+          <a:extLst>
+            <a:ext uri="{909E8E84-426E-40DD-AFC4-6F175D3DCCD1}">
+              <a14:hiddenFill xmlns:a14="http://schemas.microsoft.com/office/drawing/2010/main">
+                <a:solidFill>
+                  <a:srgbClr val="FFFFFF"/>
+                </a:solidFill>
+              </a14:hiddenFill>
+            </a:ext>
+          </a:extLst>
+        </p:spPr>
+      </p:pic>
+      <p:sp>
+        <p:nvSpPr>
+          <p:cNvPr id="3" name="ZoneTexte 2">
+            <a:extLst>
+              <a:ext uri="{FF2B5EF4-FFF2-40B4-BE49-F238E27FC236}">
+                <a16:creationId xmlns:a16="http://schemas.microsoft.com/office/drawing/2014/main" id="{16637F4C-A45D-4A64-84F7-746FFFD316BB}"/>
+              </a:ext>
+            </a:extLst>
+          </p:cNvPr>
+          <p:cNvSpPr txBox="1"/>
+          <p:nvPr/>
+        </p:nvSpPr>
+        <p:spPr>
+          <a:xfrm>
+            <a:off x="2816352" y="143435"/>
+            <a:ext cx="5897880" cy="1077218"/>
+          </a:xfrm>
+          <a:prstGeom prst="rect">
+            <a:avLst/>
+          </a:prstGeom>
+          <a:noFill/>
+          <a:ln>
+            <a:noFill/>
+          </a:ln>
+          <a:effectLst>
+            <a:glow rad="63500">
+              <a:schemeClr val="accent4">
+                <a:satMod val="175000"/>
+                <a:alpha val="40000"/>
+              </a:schemeClr>
+            </a:glow>
+            <a:outerShdw blurRad="50800" dist="38100" dir="5400000" algn="t" rotWithShape="0">
+              <a:prstClr val="black">
+                <a:alpha val="40000"/>
+              </a:prstClr>
+            </a:outerShdw>
+          </a:effectLst>
+          <a:scene3d>
+            <a:camera prst="orthographicFront">
+              <a:rot lat="0" lon="0" rev="0"/>
+            </a:camera>
+            <a:lightRig rig="soft" dir="t">
+              <a:rot lat="0" lon="0" rev="0"/>
+            </a:lightRig>
+          </a:scene3d>
+          <a:sp3d contourW="44450" prstMaterial="matte">
+            <a:bevelT w="63500" h="63500" prst="artDeco"/>
+            <a:contourClr>
+              <a:srgbClr val="FFFFFF"/>
+            </a:contourClr>
+          </a:sp3d>
+        </p:spPr>
+        <p:txBody>
+          <a:bodyPr wrap="square" rtlCol="0">
+            <a:spAutoFit/>
+          </a:bodyPr>
+          <a:lstStyle/>
+          <a:p>
+            <a:pPr algn="ctr"/>
+            <a:r>
+              <a:rPr lang="fr-FR" sz="3600" b="1" dirty="0">
+                <a:latin typeface="Eras Medium ITC" panose="020B0602030504020804" pitchFamily="34" charset="0"/>
+              </a:rPr>
+              <a:t>Diagramme de séquence : </a:t>
+            </a:r>
+            <a:r>
+              <a:rPr lang="fr-FR" sz="2800" b="1" dirty="0">
+                <a:solidFill>
+                  <a:srgbClr val="A41258"/>
+                </a:solidFill>
+                <a:latin typeface="Eras Medium ITC" panose="020B0602030504020804" pitchFamily="34" charset="0"/>
+              </a:rPr>
+              <a:t>Envoie d’un message</a:t>
+            </a:r>
+            <a:endParaRPr lang="fr-FR" sz="3200" b="1" dirty="0">
+              <a:solidFill>
+                <a:srgbClr val="A41258"/>
+              </a:solidFill>
+              <a:latin typeface="Eras Medium ITC" panose="020B0602030504020804" pitchFamily="34" charset="0"/>
+            </a:endParaRPr>
+          </a:p>
+        </p:txBody>
+      </p:sp>
+      <p:pic>
+        <p:nvPicPr>
+          <p:cNvPr id="4" name="Image 3">
+            <a:extLst>
+              <a:ext uri="{FF2B5EF4-FFF2-40B4-BE49-F238E27FC236}">
+                <a16:creationId xmlns:a16="http://schemas.microsoft.com/office/drawing/2014/main" id="{F4043A68-49AD-4B17-A66C-CEDE708FEBF0}"/>
+              </a:ext>
+            </a:extLst>
+          </p:cNvPr>
+          <p:cNvPicPr>
+            <a:picLocks noChangeAspect="1"/>
+          </p:cNvPicPr>
+          <p:nvPr/>
+        </p:nvPicPr>
+        <p:blipFill>
+          <a:blip r:embed="rId3"/>
+          <a:stretch>
+            <a:fillRect/>
+          </a:stretch>
+        </p:blipFill>
+        <p:spPr>
+          <a:xfrm>
+            <a:off x="314886" y="1220653"/>
+            <a:ext cx="8570796" cy="5600718"/>
+          </a:xfrm>
+          <a:prstGeom prst="rect">
+            <a:avLst/>
+          </a:prstGeom>
+        </p:spPr>
+      </p:pic>
+    </p:spTree>
+    <p:extLst>
+      <p:ext uri="{BB962C8B-B14F-4D97-AF65-F5344CB8AC3E}">
+        <p14:creationId xmlns:p14="http://schemas.microsoft.com/office/powerpoint/2010/main" val="2695738063"/>
+      </p:ext>
+    </p:extLst>
+  </p:cSld>
+  <p:clrMapOvr>
+    <a:masterClrMapping/>
+  </p:clrMapOvr>
+  <mc:AlternateContent xmlns:mc="http://schemas.openxmlformats.org/markup-compatibility/2006" xmlns:p159="http://schemas.microsoft.com/office/powerpoint/2015/09/main">
+    <mc:Choice Requires="p159">
+      <p:transition xmlns:p14="http://schemas.microsoft.com/office/powerpoint/2010/main" spd="slow" p14:dur="2000">
+        <p159:morph option="byObject"/>
+      </p:transition>
+    </mc:Choice>
+    <mc:Fallback xmlns="">
+      <p:transition spd="slow">
+        <p:fade/>
+      </p:transition>
+    </mc:Fallback>
+  </mc:AlternateContent>
+</p:sld>
+</file>
+
+<file path=ppt/slides/slide9.xml><?xml version="1.0" encoding="utf-8"?>
+<p:sld xmlns:a="http://schemas.openxmlformats.org/drawingml/2006/main" xmlns:r="http://schemas.openxmlformats.org/officeDocument/2006/relationships" xmlns:p="http://schemas.openxmlformats.org/presentationml/2006/main">
+  <p:cSld>
+    <p:spTree>
+      <p:nvGrpSpPr>
+        <p:cNvPr id="1" name=""/>
+        <p:cNvGrpSpPr/>
+        <p:nvPr/>
+      </p:nvGrpSpPr>
+      <p:grpSpPr>
+        <a:xfrm>
+          <a:off x="0" y="0"/>
+          <a:ext cx="0" cy="0"/>
+          <a:chOff x="0" y="0"/>
+          <a:chExt cx="0" cy="0"/>
+        </a:xfrm>
+      </p:grpSpPr>
+      <p:pic>
+        <p:nvPicPr>
+          <p:cNvPr id="1026" name="Picture 2" descr="Image associée">
+            <a:extLst>
+              <a:ext uri="{FF2B5EF4-FFF2-40B4-BE49-F238E27FC236}">
+                <a16:creationId xmlns:a16="http://schemas.microsoft.com/office/drawing/2014/main" id="{C816F3D8-CC4C-46B3-A21E-58AE9AD30454}"/>
+              </a:ext>
+            </a:extLst>
+          </p:cNvPr>
+          <p:cNvPicPr>
+            <a:picLocks noChangeAspect="1" noChangeArrowheads="1"/>
+          </p:cNvPicPr>
+          <p:nvPr/>
+        </p:nvPicPr>
+        <p:blipFill rotWithShape="1">
+          <a:blip r:embed="rId2">
+            <a:extLst>
+              <a:ext uri="{28A0092B-C50C-407E-A947-70E740481C1C}">
+                <a14:useLocalDpi xmlns:a14="http://schemas.microsoft.com/office/drawing/2010/main" val="0"/>
+              </a:ext>
+            </a:extLst>
+          </a:blip>
+          <a:srcRect l="18677" r="15441"/>
+          <a:stretch/>
+        </p:blipFill>
+        <p:spPr bwMode="auto">
+          <a:xfrm>
+            <a:off x="143436" y="143435"/>
+            <a:ext cx="2269635" cy="609600"/>
+          </a:xfrm>
+          <a:prstGeom prst="rect">
+            <a:avLst/>
+          </a:prstGeom>
+          <a:noFill/>
+          <a:extLst>
+            <a:ext uri="{909E8E84-426E-40DD-AFC4-6F175D3DCCD1}">
+              <a14:hiddenFill xmlns:a14="http://schemas.microsoft.com/office/drawing/2010/main">
+                <a:solidFill>
+                  <a:srgbClr val="FFFFFF"/>
+                </a:solidFill>
+              </a14:hiddenFill>
+            </a:ext>
+          </a:extLst>
+        </p:spPr>
+      </p:pic>
+      <p:sp>
+        <p:nvSpPr>
+          <p:cNvPr id="3" name="ZoneTexte 2">
+            <a:extLst>
+              <a:ext uri="{FF2B5EF4-FFF2-40B4-BE49-F238E27FC236}">
+                <a16:creationId xmlns:a16="http://schemas.microsoft.com/office/drawing/2014/main" id="{16637F4C-A45D-4A64-84F7-746FFFD316BB}"/>
+              </a:ext>
+            </a:extLst>
+          </p:cNvPr>
+          <p:cNvSpPr txBox="1"/>
+          <p:nvPr/>
+        </p:nvSpPr>
+        <p:spPr>
+          <a:xfrm>
+            <a:off x="2816352" y="143435"/>
+            <a:ext cx="5897880" cy="1077218"/>
+          </a:xfrm>
+          <a:prstGeom prst="rect">
+            <a:avLst/>
+          </a:prstGeom>
+          <a:noFill/>
+          <a:ln>
+            <a:noFill/>
+          </a:ln>
+          <a:effectLst>
+            <a:glow rad="63500">
+              <a:schemeClr val="accent4">
+                <a:satMod val="175000"/>
+                <a:alpha val="40000"/>
+              </a:schemeClr>
+            </a:glow>
+            <a:outerShdw blurRad="50800" dist="38100" dir="5400000" algn="t" rotWithShape="0">
+              <a:prstClr val="black">
+                <a:alpha val="40000"/>
+              </a:prstClr>
+            </a:outerShdw>
+          </a:effectLst>
+          <a:scene3d>
+            <a:camera prst="orthographicFront">
+              <a:rot lat="0" lon="0" rev="0"/>
+            </a:camera>
+            <a:lightRig rig="soft" dir="t">
+              <a:rot lat="0" lon="0" rev="0"/>
+            </a:lightRig>
+          </a:scene3d>
+          <a:sp3d contourW="44450" prstMaterial="matte">
+            <a:bevelT w="63500" h="63500" prst="artDeco"/>
+            <a:contourClr>
+              <a:srgbClr val="FFFFFF"/>
+            </a:contourClr>
+          </a:sp3d>
+        </p:spPr>
+        <p:txBody>
+          <a:bodyPr wrap="square" rtlCol="0">
+            <a:spAutoFit/>
+          </a:bodyPr>
+          <a:lstStyle/>
+          <a:p>
+            <a:pPr algn="ctr"/>
+            <a:r>
+              <a:rPr lang="fr-FR" sz="3600" b="1" dirty="0">
+                <a:latin typeface="Eras Medium ITC" panose="020B0602030504020804" pitchFamily="34" charset="0"/>
+              </a:rPr>
+              <a:t>Diagramme de séquence : </a:t>
+            </a:r>
+            <a:r>
+              <a:rPr lang="fr-FR" sz="2800" b="1" dirty="0">
+                <a:solidFill>
+                  <a:srgbClr val="A41258"/>
+                </a:solidFill>
+                <a:latin typeface="Eras Medium ITC" panose="020B0602030504020804" pitchFamily="34" charset="0"/>
+              </a:rPr>
+              <a:t>Fin de la partie</a:t>
+            </a:r>
+            <a:endParaRPr lang="fr-FR" sz="3200" b="1" dirty="0">
+              <a:solidFill>
+                <a:srgbClr val="A41258"/>
+              </a:solidFill>
+              <a:latin typeface="Eras Medium ITC" panose="020B0602030504020804" pitchFamily="34" charset="0"/>
+            </a:endParaRPr>
+          </a:p>
+        </p:txBody>
+      </p:sp>
+      <p:pic>
+        <p:nvPicPr>
+          <p:cNvPr id="4" name="Image 3">
+            <a:extLst>
+              <a:ext uri="{FF2B5EF4-FFF2-40B4-BE49-F238E27FC236}">
+                <a16:creationId xmlns:a16="http://schemas.microsoft.com/office/drawing/2014/main" id="{EB08F633-2131-4DF7-99CF-8F105CAF1306}"/>
+              </a:ext>
+            </a:extLst>
+          </p:cNvPr>
+          <p:cNvPicPr>
+            <a:picLocks noChangeAspect="1"/>
+          </p:cNvPicPr>
+          <p:nvPr/>
+        </p:nvPicPr>
+        <p:blipFill>
+          <a:blip r:embed="rId3"/>
+          <a:stretch>
+            <a:fillRect/>
+          </a:stretch>
+        </p:blipFill>
+        <p:spPr>
+          <a:xfrm>
+            <a:off x="219075" y="1666875"/>
+            <a:ext cx="9196607" cy="4610099"/>
+          </a:xfrm>
+          <a:prstGeom prst="rect">
+            <a:avLst/>
+          </a:prstGeom>
+        </p:spPr>
+      </p:pic>
+    </p:spTree>
+    <p:extLst>
+      <p:ext uri="{BB962C8B-B14F-4D97-AF65-F5344CB8AC3E}">
+        <p14:creationId xmlns:p14="http://schemas.microsoft.com/office/powerpoint/2010/main" val="296410980"/>
       </p:ext>
     </p:extLst>
   </p:cSld>

</xml_diff>